<commit_message>
Adding The API Project
</commit_message>
<xml_diff>
--- a/Learn/Website.pptx
+++ b/Learn/Website.pptx
@@ -104,6 +104,11 @@
       </a:defRPr>
     </a:lvl9pPr>
   </p:defaultTextStyle>
+  <p:extLst>
+    <p:ext uri="{EFAFB233-063F-42B5-8137-9DF3F51BA10A}">
+      <p15:sldGuideLst xmlns:p15="http://schemas.microsoft.com/office/powerpoint/2012/main"/>
+    </p:ext>
+  </p:extLst>
 </p:presentation>
 </file>
 
@@ -5743,6 +5748,145 @@
           </a:fontRef>
         </p:style>
       </p:cxnSp>
+      <p:pic>
+        <p:nvPicPr>
+          <p:cNvPr id="1026" name="Picture 2" descr="Generic Edge Rounded Big - Android Phone Png, Transparent Png ...">
+            <a:extLst>
+              <a:ext uri="{FF2B5EF4-FFF2-40B4-BE49-F238E27FC236}">
+                <a16:creationId xmlns:a16="http://schemas.microsoft.com/office/drawing/2014/main" id="{F90436F1-B654-4161-8D08-67548B05B317}"/>
+              </a:ext>
+            </a:extLst>
+          </p:cNvPr>
+          <p:cNvPicPr>
+            <a:picLocks noChangeAspect="1" noChangeArrowheads="1"/>
+          </p:cNvPicPr>
+          <p:nvPr/>
+        </p:nvPicPr>
+        <p:blipFill>
+          <a:blip r:embed="rId2">
+            <a:extLst>
+              <a:ext uri="{28A0092B-C50C-407E-A947-70E740481C1C}">
+                <a14:useLocalDpi xmlns:a14="http://schemas.microsoft.com/office/drawing/2010/main" val="0"/>
+              </a:ext>
+            </a:extLst>
+          </a:blip>
+          <a:srcRect/>
+          <a:stretch>
+            <a:fillRect/>
+          </a:stretch>
+        </p:blipFill>
+        <p:spPr bwMode="auto">
+          <a:xfrm>
+            <a:off x="1560786" y="5046943"/>
+            <a:ext cx="610970" cy="1140125"/>
+          </a:xfrm>
+          <a:prstGeom prst="rect">
+            <a:avLst/>
+          </a:prstGeom>
+          <a:noFill/>
+          <a:extLst>
+            <a:ext uri="{909E8E84-426E-40DD-AFC4-6F175D3DCCD1}">
+              <a14:hiddenFill xmlns:a14="http://schemas.microsoft.com/office/drawing/2010/main">
+                <a:solidFill>
+                  <a:srgbClr val="FFFFFF"/>
+                </a:solidFill>
+              </a14:hiddenFill>
+            </a:ext>
+          </a:extLst>
+        </p:spPr>
+      </p:pic>
+      <p:cxnSp>
+        <p:nvCxnSpPr>
+          <p:cNvPr id="54" name="Straight Arrow Connector 53">
+            <a:extLst>
+              <a:ext uri="{FF2B5EF4-FFF2-40B4-BE49-F238E27FC236}">
+                <a16:creationId xmlns:a16="http://schemas.microsoft.com/office/drawing/2014/main" id="{C2568324-2A80-4B49-95BB-5B4873FE1936}"/>
+              </a:ext>
+            </a:extLst>
+          </p:cNvPr>
+          <p:cNvCxnSpPr>
+            <a:cxnSpLocks/>
+            <a:stCxn id="1026" idx="0"/>
+            <a:endCxn id="57" idx="2"/>
+          </p:cNvCxnSpPr>
+          <p:nvPr/>
+        </p:nvCxnSpPr>
+        <p:spPr>
+          <a:xfrm flipV="1">
+            <a:off x="1866271" y="4728286"/>
+            <a:ext cx="17260" cy="318657"/>
+          </a:xfrm>
+          <a:prstGeom prst="straightConnector1">
+            <a:avLst/>
+          </a:prstGeom>
+          <a:ln>
+            <a:headEnd type="triangle"/>
+            <a:tailEnd type="triangle"/>
+          </a:ln>
+        </p:spPr>
+        <p:style>
+          <a:lnRef idx="1">
+            <a:schemeClr val="accent1"/>
+          </a:lnRef>
+          <a:fillRef idx="0">
+            <a:schemeClr val="accent1"/>
+          </a:fillRef>
+          <a:effectRef idx="0">
+            <a:schemeClr val="accent1"/>
+          </a:effectRef>
+          <a:fontRef idx="minor">
+            <a:schemeClr val="tx1"/>
+          </a:fontRef>
+        </p:style>
+      </p:cxnSp>
+      <p:sp>
+        <p:nvSpPr>
+          <p:cNvPr id="60" name="Rectangle 59">
+            <a:extLst>
+              <a:ext uri="{FF2B5EF4-FFF2-40B4-BE49-F238E27FC236}">
+                <a16:creationId xmlns:a16="http://schemas.microsoft.com/office/drawing/2014/main" id="{D1634627-064F-467F-AE93-8980821CA34F}"/>
+              </a:ext>
+            </a:extLst>
+          </p:cNvPr>
+          <p:cNvSpPr/>
+          <p:nvPr/>
+        </p:nvSpPr>
+        <p:spPr>
+          <a:xfrm>
+            <a:off x="989815" y="263945"/>
+            <a:ext cx="2326150" cy="400110"/>
+          </a:xfrm>
+          <a:prstGeom prst="rect">
+            <a:avLst/>
+          </a:prstGeom>
+          <a:noFill/>
+        </p:spPr>
+        <p:txBody>
+          <a:bodyPr wrap="square" lIns="91440" tIns="45720" rIns="91440" bIns="45720">
+            <a:spAutoFit/>
+          </a:bodyPr>
+          <a:lstStyle/>
+          <a:p>
+            <a:pPr algn="ctr"/>
+            <a:r>
+              <a:rPr lang="en-US" sz="2000" b="0" cap="none" spc="0" dirty="0">
+                <a:ln w="0"/>
+                <a:solidFill>
+                  <a:schemeClr val="tx1"/>
+                </a:solidFill>
+                <a:effectLst>
+                  <a:outerShdw blurRad="38100" dist="19050" dir="2700000" algn="tl" rotWithShape="0">
+                    <a:schemeClr val="dk1">
+                      <a:alpha val="40000"/>
+                    </a:schemeClr>
+                  </a:outerShdw>
+                </a:effectLst>
+              </a:rPr>
+              <a:t>Presentation Layers</a:t>
+            </a:r>
+          </a:p>
+        </p:txBody>
+      </p:sp>
     </p:spTree>
     <p:extLst>
       <p:ext uri="{BB962C8B-B14F-4D97-AF65-F5344CB8AC3E}">

</xml_diff>